<commit_message>
Latest Version of Powerpoint
</commit_message>
<xml_diff>
--- a/Gatliffe-Panter-Zhang.pptx
+++ b/Gatliffe-Panter-Zhang.pptx
@@ -9,14 +9,14 @@
   </p:notesMasterIdLst>
   <p:sldIdLst>
     <p:sldId id="256" r:id="rId2"/>
-    <p:sldId id="258" r:id="rId3"/>
-    <p:sldId id="257" r:id="rId4"/>
+    <p:sldId id="257" r:id="rId3"/>
+    <p:sldId id="258" r:id="rId4"/>
     <p:sldId id="259" r:id="rId5"/>
     <p:sldId id="260" r:id="rId6"/>
     <p:sldId id="261" r:id="rId7"/>
-    <p:sldId id="262" r:id="rId8"/>
-    <p:sldId id="263" r:id="rId9"/>
-    <p:sldId id="264" r:id="rId10"/>
+    <p:sldId id="263" r:id="rId8"/>
+    <p:sldId id="264" r:id="rId9"/>
+    <p:sldId id="262" r:id="rId10"/>
     <p:sldId id="265" r:id="rId11"/>
     <p:sldId id="266" r:id="rId12"/>
     <p:sldId id="267" r:id="rId13"/>
@@ -637,7 +637,7 @@
     </p:spTree>
     <p:extLst>
       <p:ext uri="{BB962C8B-B14F-4D97-AF65-F5344CB8AC3E}">
-        <p14:creationId xmlns:p14="http://schemas.microsoft.com/office/powerpoint/2010/main" val="2143740425"/>
+        <p14:creationId xmlns:p14="http://schemas.microsoft.com/office/powerpoint/2010/main" val="1454765891"/>
       </p:ext>
     </p:extLst>
   </p:cSld>
@@ -725,7 +725,7 @@
     </p:spTree>
     <p:extLst>
       <p:ext uri="{BB962C8B-B14F-4D97-AF65-F5344CB8AC3E}">
-        <p14:creationId xmlns:p14="http://schemas.microsoft.com/office/powerpoint/2010/main" val="1454765891"/>
+        <p14:creationId xmlns:p14="http://schemas.microsoft.com/office/powerpoint/2010/main" val="2143740425"/>
       </p:ext>
     </p:extLst>
   </p:cSld>
@@ -916,7 +916,7 @@
           <a:p>
             <a:fld id="{E121D6F8-755F-EB41-B367-AF4A25671245}" type="datetimeFigureOut">
               <a:rPr lang="en-US" smtClean="0"/>
-              <a:t>9/23/18</a:t>
+              <a:t>9/24/18</a:t>
             </a:fld>
             <a:endParaRPr lang="en-US"/>
           </a:p>
@@ -1086,7 +1086,7 @@
           <a:p>
             <a:fld id="{E121D6F8-755F-EB41-B367-AF4A25671245}" type="datetimeFigureOut">
               <a:rPr lang="en-US" smtClean="0"/>
-              <a:t>9/23/18</a:t>
+              <a:t>9/24/18</a:t>
             </a:fld>
             <a:endParaRPr lang="en-US"/>
           </a:p>
@@ -1266,7 +1266,7 @@
           <a:p>
             <a:fld id="{E121D6F8-755F-EB41-B367-AF4A25671245}" type="datetimeFigureOut">
               <a:rPr lang="en-US" smtClean="0"/>
-              <a:t>9/23/18</a:t>
+              <a:t>9/24/18</a:t>
             </a:fld>
             <a:endParaRPr lang="en-US"/>
           </a:p>
@@ -1436,7 +1436,7 @@
           <a:p>
             <a:fld id="{E121D6F8-755F-EB41-B367-AF4A25671245}" type="datetimeFigureOut">
               <a:rPr lang="en-US" smtClean="0"/>
-              <a:t>9/23/18</a:t>
+              <a:t>9/24/18</a:t>
             </a:fld>
             <a:endParaRPr lang="en-US"/>
           </a:p>
@@ -1682,7 +1682,7 @@
           <a:p>
             <a:fld id="{E121D6F8-755F-EB41-B367-AF4A25671245}" type="datetimeFigureOut">
               <a:rPr lang="en-US" smtClean="0"/>
-              <a:t>9/23/18</a:t>
+              <a:t>9/24/18</a:t>
             </a:fld>
             <a:endParaRPr lang="en-US"/>
           </a:p>
@@ -1970,7 +1970,7 @@
           <a:p>
             <a:fld id="{E121D6F8-755F-EB41-B367-AF4A25671245}" type="datetimeFigureOut">
               <a:rPr lang="en-US" smtClean="0"/>
-              <a:t>9/23/18</a:t>
+              <a:t>9/24/18</a:t>
             </a:fld>
             <a:endParaRPr lang="en-US"/>
           </a:p>
@@ -2392,7 +2392,7 @@
           <a:p>
             <a:fld id="{E121D6F8-755F-EB41-B367-AF4A25671245}" type="datetimeFigureOut">
               <a:rPr lang="en-US" smtClean="0"/>
-              <a:t>9/23/18</a:t>
+              <a:t>9/24/18</a:t>
             </a:fld>
             <a:endParaRPr lang="en-US"/>
           </a:p>
@@ -2510,7 +2510,7 @@
           <a:p>
             <a:fld id="{E121D6F8-755F-EB41-B367-AF4A25671245}" type="datetimeFigureOut">
               <a:rPr lang="en-US" smtClean="0"/>
-              <a:t>9/23/18</a:t>
+              <a:t>9/24/18</a:t>
             </a:fld>
             <a:endParaRPr lang="en-US"/>
           </a:p>
@@ -2605,7 +2605,7 @@
           <a:p>
             <a:fld id="{E121D6F8-755F-EB41-B367-AF4A25671245}" type="datetimeFigureOut">
               <a:rPr lang="en-US" smtClean="0"/>
-              <a:t>9/23/18</a:t>
+              <a:t>9/24/18</a:t>
             </a:fld>
             <a:endParaRPr lang="en-US"/>
           </a:p>
@@ -2882,7 +2882,7 @@
           <a:p>
             <a:fld id="{E121D6F8-755F-EB41-B367-AF4A25671245}" type="datetimeFigureOut">
               <a:rPr lang="en-US" smtClean="0"/>
-              <a:t>9/23/18</a:t>
+              <a:t>9/24/18</a:t>
             </a:fld>
             <a:endParaRPr lang="en-US"/>
           </a:p>
@@ -3135,7 +3135,7 @@
           <a:p>
             <a:fld id="{E121D6F8-755F-EB41-B367-AF4A25671245}" type="datetimeFigureOut">
               <a:rPr lang="en-US" smtClean="0"/>
-              <a:t>9/23/18</a:t>
+              <a:t>9/24/18</a:t>
             </a:fld>
             <a:endParaRPr lang="en-US"/>
           </a:p>
@@ -3365,7 +3365,7 @@
           <a:p>
             <a:fld id="{E121D6F8-755F-EB41-B367-AF4A25671245}" type="datetimeFigureOut">
               <a:rPr lang="en-US" smtClean="0"/>
-              <a:t>9/23/18</a:t>
+              <a:t>9/24/18</a:t>
             </a:fld>
             <a:endParaRPr lang="en-US"/>
           </a:p>
@@ -4014,7 +4014,11 @@
           <a:bodyPr/>
           <a:lstStyle/>
           <a:p>
-            <a:endParaRPr lang="en-US"/>
+            <a:r>
+              <a:rPr lang="en-US" dirty="0" smtClean="0"/>
+              <a:t>Model Selection</a:t>
+            </a:r>
+            <a:endParaRPr lang="en-US" dirty="0"/>
           </a:p>
         </p:txBody>
       </p:sp>
@@ -4033,7 +4037,28 @@
           <a:bodyPr/>
           <a:lstStyle/>
           <a:p>
-            <a:endParaRPr lang="en-US"/>
+            <a:r>
+              <a:rPr lang="en-US" dirty="0" smtClean="0"/>
+              <a:t>Forward, Backward, and </a:t>
+            </a:r>
+            <a:r>
+              <a:rPr lang="en-US" smtClean="0"/>
+              <a:t>Stepwise run for </a:t>
+            </a:r>
+            <a:r>
+              <a:rPr lang="en-US" dirty="0" smtClean="0"/>
+              <a:t>each model, t=-24,-12, -6, -3 </a:t>
+            </a:r>
+            <a:r>
+              <a:rPr lang="en-US" smtClean="0"/>
+              <a:t>, 1</a:t>
+            </a:r>
+          </a:p>
+          <a:p>
+            <a:endParaRPr lang="en-US" dirty="0" smtClean="0"/>
+          </a:p>
+          <a:p>
+            <a:endParaRPr lang="en-US" dirty="0"/>
           </a:p>
         </p:txBody>
       </p:sp>
@@ -4187,6 +4212,118 @@
 </file>
 
 <file path=ppt/slides/slide2.xml><?xml version="1.0" encoding="utf-8"?>
+<p:sld xmlns:a="http://schemas.openxmlformats.org/drawingml/2006/main" xmlns:r="http://schemas.openxmlformats.org/officeDocument/2006/relationships" xmlns:p="http://schemas.openxmlformats.org/presentationml/2006/main">
+  <p:cSld>
+    <p:spTree>
+      <p:nvGrpSpPr>
+        <p:cNvPr id="1" name=""/>
+        <p:cNvGrpSpPr/>
+        <p:nvPr/>
+      </p:nvGrpSpPr>
+      <p:grpSpPr>
+        <a:xfrm>
+          <a:off x="0" y="0"/>
+          <a:ext cx="0" cy="0"/>
+          <a:chOff x="0" y="0"/>
+          <a:chExt cx="0" cy="0"/>
+        </a:xfrm>
+      </p:grpSpPr>
+      <p:sp>
+        <p:nvSpPr>
+          <p:cNvPr id="2" name="Title 1"/>
+          <p:cNvSpPr>
+            <a:spLocks noGrp="1"/>
+          </p:cNvSpPr>
+          <p:nvPr>
+            <p:ph type="title"/>
+          </p:nvPr>
+        </p:nvSpPr>
+        <p:spPr/>
+        <p:txBody>
+          <a:bodyPr/>
+          <a:lstStyle/>
+          <a:p>
+            <a:r>
+              <a:rPr lang="en-US" b="1" dirty="0" smtClean="0"/>
+              <a:t>The Data Set</a:t>
+            </a:r>
+            <a:endParaRPr lang="en-US" b="1" dirty="0"/>
+          </a:p>
+        </p:txBody>
+      </p:sp>
+      <p:sp>
+        <p:nvSpPr>
+          <p:cNvPr id="3" name="Content Placeholder 2"/>
+          <p:cNvSpPr>
+            <a:spLocks noGrp="1"/>
+          </p:cNvSpPr>
+          <p:nvPr>
+            <p:ph idx="1"/>
+          </p:nvPr>
+        </p:nvSpPr>
+        <p:spPr/>
+        <p:txBody>
+          <a:bodyPr>
+            <a:normAutofit/>
+          </a:bodyPr>
+          <a:lstStyle/>
+          <a:p>
+            <a:pPr marL="0" indent="0">
+              <a:buNone/>
+            </a:pPr>
+            <a:r>
+              <a:rPr lang="is-IS" dirty="0" smtClean="0"/>
+              <a:t>Hourly readings from Denver International Airport taken between  1 September 2013 and 31 August 2018</a:t>
+            </a:r>
+          </a:p>
+          <a:p>
+            <a:pPr marL="0" indent="0">
+              <a:buNone/>
+            </a:pPr>
+            <a:endParaRPr lang="is-IS" dirty="0"/>
+          </a:p>
+          <a:p>
+            <a:pPr marL="0" indent="0">
+              <a:buNone/>
+            </a:pPr>
+            <a:r>
+              <a:rPr lang="is-IS" dirty="0" smtClean="0"/>
+              <a:t>Variables recorded include: temperature, pressure, humidity, wind speed and direction,  precipitation accumulation, cloud cover and course and fine categorical descriptions. </a:t>
+            </a:r>
+            <a:r>
+              <a:rPr lang="is-IS" dirty="0"/>
+              <a:t> </a:t>
+            </a:r>
+            <a:r>
+              <a:rPr lang="is-IS" dirty="0" smtClean="0"/>
+              <a:t> </a:t>
+            </a:r>
+            <a:r>
+              <a:rPr lang="is-IS" dirty="0"/>
+              <a:t> </a:t>
+            </a:r>
+            <a:r>
+              <a:rPr lang="is-IS" dirty="0" smtClean="0"/>
+              <a:t> </a:t>
+            </a:r>
+            <a:endParaRPr lang="en-US" dirty="0"/>
+          </a:p>
+        </p:txBody>
+      </p:sp>
+    </p:spTree>
+    <p:extLst>
+      <p:ext uri="{BB962C8B-B14F-4D97-AF65-F5344CB8AC3E}">
+        <p14:creationId xmlns:p14="http://schemas.microsoft.com/office/powerpoint/2010/main" val="1944008293"/>
+      </p:ext>
+    </p:extLst>
+  </p:cSld>
+  <p:clrMapOvr>
+    <a:masterClrMapping/>
+  </p:clrMapOvr>
+</p:sld>
+</file>
+
+<file path=ppt/slides/slide3.xml><?xml version="1.0" encoding="utf-8"?>
 <p:sld xmlns:a="http://schemas.openxmlformats.org/drawingml/2006/main" xmlns:r="http://schemas.openxmlformats.org/officeDocument/2006/relationships" xmlns:p="http://schemas.openxmlformats.org/presentationml/2006/main">
   <p:cSld>
     <p:spTree>
@@ -4363,7 +4500,28 @@
                   </a:outerShdw>
                 </a:effectLst>
               </a:rPr>
-              <a:t>How far in advance can we </a:t>
+              <a:t>Using only these variables, how </a:t>
+            </a:r>
+            <a:r>
+              <a:rPr lang="en-US" b="1" dirty="0" smtClean="0">
+                <a:ln w="18415" cmpd="sng">
+                  <a:solidFill>
+                    <a:srgbClr val="FFFFFF"/>
+                  </a:solidFill>
+                  <a:prstDash val="solid"/>
+                </a:ln>
+                <a:solidFill>
+                  <a:srgbClr val="FFFFFF"/>
+                </a:solidFill>
+                <a:effectLst>
+                  <a:outerShdw blurRad="63500" dir="3600000" algn="tl" rotWithShape="0">
+                    <a:srgbClr val="000000">
+                      <a:alpha val="70000"/>
+                    </a:srgbClr>
+                  </a:outerShdw>
+                </a:effectLst>
+              </a:rPr>
+              <a:t>far in advance can we </a:t>
             </a:r>
             <a:r>
               <a:rPr lang="en-US" b="1" dirty="0">
@@ -4408,7 +4566,7 @@
               <a:t>predict </a:t>
             </a:r>
             <a:r>
-              <a:rPr lang="en-US" b="1" dirty="0">
+              <a:rPr lang="en-US" b="1" dirty="0" smtClean="0">
                 <a:ln w="18415" cmpd="sng">
                   <a:solidFill>
                     <a:srgbClr val="FFFFFF"/>
@@ -4426,7 +4584,28 @@
                   </a:outerShdw>
                 </a:effectLst>
               </a:rPr>
-              <a:t>precipitation (yes/no) </a:t>
+              <a:t>precipitation (</a:t>
+            </a:r>
+            <a:r>
+              <a:rPr lang="en-US" b="1" dirty="0">
+                <a:ln w="18415" cmpd="sng">
+                  <a:solidFill>
+                    <a:srgbClr val="FFFFFF"/>
+                  </a:solidFill>
+                  <a:prstDash val="solid"/>
+                </a:ln>
+                <a:solidFill>
+                  <a:srgbClr val="FFFFFF"/>
+                </a:solidFill>
+                <a:effectLst>
+                  <a:outerShdw blurRad="63500" dir="3600000" algn="tl" rotWithShape="0">
+                    <a:srgbClr val="000000">
+                      <a:alpha val="70000"/>
+                    </a:srgbClr>
+                  </a:outerShdw>
+                </a:effectLst>
+              </a:rPr>
+              <a:t>yes/no) </a:t>
             </a:r>
             <a:r>
               <a:rPr lang="en-US" b="1" dirty="0" smtClean="0">
@@ -4515,118 +4694,6 @@
     <p:extLst>
       <p:ext uri="{BB962C8B-B14F-4D97-AF65-F5344CB8AC3E}">
         <p14:creationId xmlns:p14="http://schemas.microsoft.com/office/powerpoint/2010/main" val="2468385637"/>
-      </p:ext>
-    </p:extLst>
-  </p:cSld>
-  <p:clrMapOvr>
-    <a:masterClrMapping/>
-  </p:clrMapOvr>
-</p:sld>
-</file>
-
-<file path=ppt/slides/slide3.xml><?xml version="1.0" encoding="utf-8"?>
-<p:sld xmlns:a="http://schemas.openxmlformats.org/drawingml/2006/main" xmlns:r="http://schemas.openxmlformats.org/officeDocument/2006/relationships" xmlns:p="http://schemas.openxmlformats.org/presentationml/2006/main">
-  <p:cSld>
-    <p:spTree>
-      <p:nvGrpSpPr>
-        <p:cNvPr id="1" name=""/>
-        <p:cNvGrpSpPr/>
-        <p:nvPr/>
-      </p:nvGrpSpPr>
-      <p:grpSpPr>
-        <a:xfrm>
-          <a:off x="0" y="0"/>
-          <a:ext cx="0" cy="0"/>
-          <a:chOff x="0" y="0"/>
-          <a:chExt cx="0" cy="0"/>
-        </a:xfrm>
-      </p:grpSpPr>
-      <p:sp>
-        <p:nvSpPr>
-          <p:cNvPr id="2" name="Title 1"/>
-          <p:cNvSpPr>
-            <a:spLocks noGrp="1"/>
-          </p:cNvSpPr>
-          <p:nvPr>
-            <p:ph type="title"/>
-          </p:nvPr>
-        </p:nvSpPr>
-        <p:spPr/>
-        <p:txBody>
-          <a:bodyPr/>
-          <a:lstStyle/>
-          <a:p>
-            <a:r>
-              <a:rPr lang="en-US" b="1" dirty="0" smtClean="0"/>
-              <a:t>The Data Set</a:t>
-            </a:r>
-            <a:endParaRPr lang="en-US" b="1" dirty="0"/>
-          </a:p>
-        </p:txBody>
-      </p:sp>
-      <p:sp>
-        <p:nvSpPr>
-          <p:cNvPr id="3" name="Content Placeholder 2"/>
-          <p:cNvSpPr>
-            <a:spLocks noGrp="1"/>
-          </p:cNvSpPr>
-          <p:nvPr>
-            <p:ph idx="1"/>
-          </p:nvPr>
-        </p:nvSpPr>
-        <p:spPr/>
-        <p:txBody>
-          <a:bodyPr>
-            <a:normAutofit/>
-          </a:bodyPr>
-          <a:lstStyle/>
-          <a:p>
-            <a:pPr marL="0" indent="0">
-              <a:buNone/>
-            </a:pPr>
-            <a:r>
-              <a:rPr lang="is-IS" dirty="0" smtClean="0"/>
-              <a:t>Hourly readings from Denver International Airport taken between  1 September 2013 and 31 August 2018</a:t>
-            </a:r>
-          </a:p>
-          <a:p>
-            <a:pPr marL="0" indent="0">
-              <a:buNone/>
-            </a:pPr>
-            <a:endParaRPr lang="is-IS" dirty="0"/>
-          </a:p>
-          <a:p>
-            <a:pPr marL="0" indent="0">
-              <a:buNone/>
-            </a:pPr>
-            <a:r>
-              <a:rPr lang="is-IS" dirty="0" smtClean="0"/>
-              <a:t>Variables recorded include: temperature, pressure, humidity, wind speed and direction,  precipitation accumulation, cloud cover and course and fine categorical descriptions. </a:t>
-            </a:r>
-            <a:r>
-              <a:rPr lang="is-IS" dirty="0"/>
-              <a:t> </a:t>
-            </a:r>
-            <a:r>
-              <a:rPr lang="is-IS" dirty="0" smtClean="0"/>
-              <a:t> </a:t>
-            </a:r>
-            <a:r>
-              <a:rPr lang="is-IS" dirty="0"/>
-              <a:t> </a:t>
-            </a:r>
-            <a:r>
-              <a:rPr lang="is-IS" dirty="0" smtClean="0"/>
-              <a:t> </a:t>
-            </a:r>
-            <a:endParaRPr lang="en-US" dirty="0"/>
-          </a:p>
-        </p:txBody>
-      </p:sp>
-    </p:spTree>
-    <p:extLst>
-      <p:ext uri="{BB962C8B-B14F-4D97-AF65-F5344CB8AC3E}">
-        <p14:creationId xmlns:p14="http://schemas.microsoft.com/office/powerpoint/2010/main" val="1944008293"/>
       </p:ext>
     </p:extLst>
   </p:cSld>
@@ -4672,25 +4739,36 @@
           </a:p>
         </p:txBody>
       </p:sp>
-      <p:sp>
-        <p:nvSpPr>
-          <p:cNvPr id="3" name="Content Placeholder 2"/>
-          <p:cNvSpPr>
-            <a:spLocks noGrp="1"/>
-          </p:cNvSpPr>
-          <p:nvPr>
-            <p:ph idx="1"/>
-          </p:nvPr>
-        </p:nvSpPr>
-        <p:spPr/>
-        <p:txBody>
-          <a:bodyPr/>
-          <a:lstStyle/>
-          <a:p>
-            <a:endParaRPr lang="en-US"/>
-          </a:p>
-        </p:txBody>
-      </p:sp>
+      <p:pic>
+        <p:nvPicPr>
+          <p:cNvPr id="4" name="Picture 3" descr="Rplot01.png"/>
+          <p:cNvPicPr>
+            <a:picLocks noChangeAspect="1"/>
+          </p:cNvPicPr>
+          <p:nvPr/>
+        </p:nvPicPr>
+        <p:blipFill>
+          <a:blip r:embed="rId2">
+            <a:extLst>
+              <a:ext uri="{28A0092B-C50C-407E-A947-70E740481C1C}">
+                <a14:useLocalDpi xmlns:a14="http://schemas.microsoft.com/office/drawing/2010/main" val="0"/>
+              </a:ext>
+            </a:extLst>
+          </a:blip>
+          <a:stretch>
+            <a:fillRect/>
+          </a:stretch>
+        </p:blipFill>
+        <p:spPr>
+          <a:xfrm>
+            <a:off x="334854" y="2050076"/>
+            <a:ext cx="8448580" cy="3661051"/>
+          </a:xfrm>
+          <a:prstGeom prst="rect">
+            <a:avLst/>
+          </a:prstGeom>
+        </p:spPr>
+      </p:pic>
     </p:spTree>
     <p:extLst>
       <p:ext uri="{BB962C8B-B14F-4D97-AF65-F5344CB8AC3E}">
@@ -4736,29 +4814,40 @@
           <a:bodyPr/>
           <a:lstStyle/>
           <a:p>
-            <a:endParaRPr lang="en-US"/>
-          </a:p>
-        </p:txBody>
-      </p:sp>
-      <p:sp>
-        <p:nvSpPr>
-          <p:cNvPr id="3" name="Content Placeholder 2"/>
-          <p:cNvSpPr>
-            <a:spLocks noGrp="1"/>
-          </p:cNvSpPr>
-          <p:nvPr>
-            <p:ph idx="1"/>
-          </p:nvPr>
-        </p:nvSpPr>
-        <p:spPr/>
-        <p:txBody>
-          <a:bodyPr/>
-          <a:lstStyle/>
-          <a:p>
-            <a:endParaRPr lang="en-US"/>
-          </a:p>
-        </p:txBody>
-      </p:sp>
+            <a:endParaRPr lang="en-US" dirty="0"/>
+          </a:p>
+        </p:txBody>
+      </p:sp>
+      <p:pic>
+        <p:nvPicPr>
+          <p:cNvPr id="10" name="Picture 9" descr="Rplot05.png"/>
+          <p:cNvPicPr>
+            <a:picLocks noChangeAspect="1"/>
+          </p:cNvPicPr>
+          <p:nvPr/>
+        </p:nvPicPr>
+        <p:blipFill>
+          <a:blip r:embed="rId2">
+            <a:extLst>
+              <a:ext uri="{28A0092B-C50C-407E-A947-70E740481C1C}">
+                <a14:useLocalDpi xmlns:a14="http://schemas.microsoft.com/office/drawing/2010/main" val="0"/>
+              </a:ext>
+            </a:extLst>
+          </a:blip>
+          <a:stretch>
+            <a:fillRect/>
+          </a:stretch>
+        </p:blipFill>
+        <p:spPr>
+          <a:xfrm>
+            <a:off x="0" y="1815866"/>
+            <a:ext cx="9144000" cy="3965266"/>
+          </a:xfrm>
+          <a:prstGeom prst="rect">
+            <a:avLst/>
+          </a:prstGeom>
+        </p:spPr>
+      </p:pic>
     </p:spTree>
     <p:extLst>
       <p:ext uri="{BB962C8B-B14F-4D97-AF65-F5344CB8AC3E}">
@@ -4804,29 +4893,39 @@
           <a:bodyPr/>
           <a:lstStyle/>
           <a:p>
-            <a:endParaRPr lang="en-US"/>
-          </a:p>
-        </p:txBody>
-      </p:sp>
-      <p:sp>
-        <p:nvSpPr>
-          <p:cNvPr id="3" name="Content Placeholder 2"/>
-          <p:cNvSpPr>
-            <a:spLocks noGrp="1"/>
-          </p:cNvSpPr>
+            <a:r>
+              <a:rPr lang="en-US" dirty="0" smtClean="0"/>
+              <a:t>Current Condition Regressions</a:t>
+            </a:r>
+            <a:endParaRPr lang="en-US" dirty="0"/>
+          </a:p>
+        </p:txBody>
+      </p:sp>
+      <p:pic>
+        <p:nvPicPr>
+          <p:cNvPr id="4" name="Content Placeholder 3" descr="Rplot06.png"/>
+          <p:cNvPicPr>
+            <a:picLocks noGrp="1" noChangeAspect="1"/>
+          </p:cNvPicPr>
           <p:nvPr>
             <p:ph idx="1"/>
           </p:nvPr>
-        </p:nvSpPr>
+        </p:nvPicPr>
+        <p:blipFill>
+          <a:blip r:embed="rId2">
+            <a:extLst>
+              <a:ext uri="{28A0092B-C50C-407E-A947-70E740481C1C}">
+                <a14:useLocalDpi xmlns:a14="http://schemas.microsoft.com/office/drawing/2010/main" val="0"/>
+              </a:ext>
+            </a:extLst>
+          </a:blip>
+          <a:srcRect l="5301" r="5301"/>
+          <a:stretch>
+            <a:fillRect/>
+          </a:stretch>
+        </p:blipFill>
         <p:spPr/>
-        <p:txBody>
-          <a:bodyPr/>
-          <a:lstStyle/>
-          <a:p>
-            <a:endParaRPr lang="en-US"/>
-          </a:p>
-        </p:txBody>
-      </p:sp>
+      </p:pic>
     </p:spTree>
     <p:extLst>
       <p:ext uri="{BB962C8B-B14F-4D97-AF65-F5344CB8AC3E}">
@@ -4841,6 +4940,1295 @@
 </file>
 
 <file path=ppt/slides/slide7.xml><?xml version="1.0" encoding="utf-8"?>
+<p:sld xmlns:a="http://schemas.openxmlformats.org/drawingml/2006/main" xmlns:r="http://schemas.openxmlformats.org/officeDocument/2006/relationships" xmlns:p="http://schemas.openxmlformats.org/presentationml/2006/main">
+  <p:cSld>
+    <p:spTree>
+      <p:nvGrpSpPr>
+        <p:cNvPr id="1" name=""/>
+        <p:cNvGrpSpPr/>
+        <p:nvPr/>
+      </p:nvGrpSpPr>
+      <p:grpSpPr>
+        <a:xfrm>
+          <a:off x="0" y="0"/>
+          <a:ext cx="0" cy="0"/>
+          <a:chOff x="0" y="0"/>
+          <a:chExt cx="0" cy="0"/>
+        </a:xfrm>
+      </p:grpSpPr>
+      <p:pic>
+        <p:nvPicPr>
+          <p:cNvPr id="4" name="Picture 3" descr="522795232-612x612.jpg"/>
+          <p:cNvPicPr>
+            <a:picLocks noChangeAspect="1"/>
+          </p:cNvPicPr>
+          <p:nvPr/>
+        </p:nvPicPr>
+        <p:blipFill>
+          <a:blip r:embed="rId2">
+            <a:alphaModFix/>
+            <a:extLst>
+              <a:ext uri="{28A0092B-C50C-407E-A947-70E740481C1C}">
+                <a14:useLocalDpi xmlns:a14="http://schemas.microsoft.com/office/drawing/2010/main" val="0"/>
+              </a:ext>
+            </a:extLst>
+          </a:blip>
+          <a:stretch>
+            <a:fillRect/>
+          </a:stretch>
+        </p:blipFill>
+        <p:spPr>
+          <a:xfrm>
+            <a:off x="-834625" y="-96641"/>
+            <a:ext cx="10384946" cy="7109955"/>
+          </a:xfrm>
+          <a:prstGeom prst="rect">
+            <a:avLst/>
+          </a:prstGeom>
+        </p:spPr>
+      </p:pic>
+      <p:sp>
+        <p:nvSpPr>
+          <p:cNvPr id="2" name="Title 1"/>
+          <p:cNvSpPr>
+            <a:spLocks noGrp="1"/>
+          </p:cNvSpPr>
+          <p:nvPr>
+            <p:ph type="title"/>
+          </p:nvPr>
+        </p:nvSpPr>
+        <p:spPr/>
+        <p:txBody>
+          <a:bodyPr/>
+          <a:lstStyle/>
+          <a:p>
+            <a:r>
+              <a:rPr lang="en-US" dirty="0" smtClean="0">
+                <a:ln w="18415" cmpd="sng">
+                  <a:solidFill>
+                    <a:srgbClr val="FFFFFF"/>
+                  </a:solidFill>
+                  <a:prstDash val="solid"/>
+                </a:ln>
+                <a:solidFill>
+                  <a:srgbClr val="FFFFFF"/>
+                </a:solidFill>
+                <a:effectLst>
+                  <a:outerShdw blurRad="63500" dir="3600000" algn="tl" rotWithShape="0">
+                    <a:srgbClr val="000000">
+                      <a:alpha val="70000"/>
+                    </a:srgbClr>
+                  </a:outerShdw>
+                </a:effectLst>
+              </a:rPr>
+              <a:t>Data Cleaning</a:t>
+            </a:r>
+            <a:endParaRPr lang="en-US" dirty="0">
+              <a:ln w="18415" cmpd="sng">
+                <a:solidFill>
+                  <a:srgbClr val="FFFFFF"/>
+                </a:solidFill>
+                <a:prstDash val="solid"/>
+              </a:ln>
+              <a:solidFill>
+                <a:srgbClr val="FFFFFF"/>
+              </a:solidFill>
+              <a:effectLst>
+                <a:outerShdw blurRad="63500" dir="3600000" algn="tl" rotWithShape="0">
+                  <a:srgbClr val="000000">
+                    <a:alpha val="70000"/>
+                  </a:srgbClr>
+                </a:outerShdw>
+              </a:effectLst>
+            </a:endParaRPr>
+          </a:p>
+        </p:txBody>
+      </p:sp>
+      <p:sp>
+        <p:nvSpPr>
+          <p:cNvPr id="3" name="Content Placeholder 2"/>
+          <p:cNvSpPr>
+            <a:spLocks noGrp="1"/>
+          </p:cNvSpPr>
+          <p:nvPr>
+            <p:ph idx="1"/>
+          </p:nvPr>
+        </p:nvSpPr>
+        <p:spPr/>
+        <p:txBody>
+          <a:bodyPr>
+            <a:normAutofit fontScale="77500" lnSpcReduction="20000"/>
+          </a:bodyPr>
+          <a:lstStyle/>
+          <a:p>
+            <a:r>
+              <a:rPr lang="en-US" dirty="0">
+                <a:ln w="18415" cmpd="sng">
+                  <a:solidFill>
+                    <a:srgbClr val="FFFFFF"/>
+                  </a:solidFill>
+                  <a:prstDash val="solid"/>
+                </a:ln>
+                <a:solidFill>
+                  <a:srgbClr val="FFFFFF"/>
+                </a:solidFill>
+                <a:effectLst>
+                  <a:outerShdw blurRad="63500" dir="3600000" algn="tl" rotWithShape="0">
+                    <a:srgbClr val="000000">
+                      <a:alpha val="70000"/>
+                    </a:srgbClr>
+                  </a:outerShdw>
+                </a:effectLst>
+              </a:rPr>
+              <a:t>Interpolated missing  </a:t>
+            </a:r>
+            <a:r>
+              <a:rPr lang="en-US" i="1" dirty="0" err="1">
+                <a:ln w="18415" cmpd="sng">
+                  <a:solidFill>
+                    <a:srgbClr val="FFFFFF"/>
+                  </a:solidFill>
+                  <a:prstDash val="solid"/>
+                </a:ln>
+                <a:solidFill>
+                  <a:srgbClr val="FFFFFF"/>
+                </a:solidFill>
+                <a:effectLst>
+                  <a:outerShdw blurRad="63500" dir="3600000" algn="tl" rotWithShape="0">
+                    <a:srgbClr val="000000">
+                      <a:alpha val="70000"/>
+                    </a:srgbClr>
+                  </a:outerShdw>
+                </a:effectLst>
+              </a:rPr>
+              <a:t>x</a:t>
+            </a:r>
+            <a:r>
+              <a:rPr lang="en-US" i="1" baseline="-25000" dirty="0" err="1">
+                <a:ln w="18415" cmpd="sng">
+                  <a:solidFill>
+                    <a:srgbClr val="FFFFFF"/>
+                  </a:solidFill>
+                  <a:prstDash val="solid"/>
+                </a:ln>
+                <a:solidFill>
+                  <a:srgbClr val="FFFFFF"/>
+                </a:solidFill>
+                <a:effectLst>
+                  <a:outerShdw blurRad="63500" dir="3600000" algn="tl" rotWithShape="0">
+                    <a:srgbClr val="000000">
+                      <a:alpha val="70000"/>
+                    </a:srgbClr>
+                  </a:outerShdw>
+                </a:effectLst>
+              </a:rPr>
+              <a:t>t</a:t>
+            </a:r>
+            <a:r>
+              <a:rPr lang="en-US" dirty="0">
+                <a:ln w="18415" cmpd="sng">
+                  <a:solidFill>
+                    <a:srgbClr val="FFFFFF"/>
+                  </a:solidFill>
+                  <a:prstDash val="solid"/>
+                </a:ln>
+                <a:solidFill>
+                  <a:srgbClr val="FFFFFF"/>
+                </a:solidFill>
+                <a:effectLst>
+                  <a:outerShdw blurRad="63500" dir="3600000" algn="tl" rotWithShape="0">
+                    <a:srgbClr val="000000">
+                      <a:alpha val="70000"/>
+                    </a:srgbClr>
+                  </a:outerShdw>
+                </a:effectLst>
+              </a:rPr>
+              <a:t> </a:t>
+            </a:r>
+            <a:r>
+              <a:rPr lang="en-US" i="1" dirty="0" smtClean="0">
+                <a:ln w="18415" cmpd="sng">
+                  <a:solidFill>
+                    <a:srgbClr val="FFFFFF"/>
+                  </a:solidFill>
+                  <a:prstDash val="solid"/>
+                </a:ln>
+                <a:solidFill>
+                  <a:srgbClr val="FFFFFF"/>
+                </a:solidFill>
+                <a:effectLst>
+                  <a:outerShdw blurRad="63500" dir="3600000" algn="tl" rotWithShape="0">
+                    <a:srgbClr val="000000">
+                      <a:alpha val="70000"/>
+                    </a:srgbClr>
+                  </a:outerShdw>
+                </a:effectLst>
+              </a:rPr>
+              <a:t> </a:t>
+            </a:r>
+            <a:r>
+              <a:rPr lang="en-US" dirty="0" smtClean="0">
+                <a:ln w="18415" cmpd="sng">
+                  <a:solidFill>
+                    <a:srgbClr val="FFFFFF"/>
+                  </a:solidFill>
+                  <a:prstDash val="solid"/>
+                </a:ln>
+                <a:solidFill>
+                  <a:srgbClr val="FFFFFF"/>
+                </a:solidFill>
+                <a:effectLst>
+                  <a:outerShdw blurRad="63500" dir="3600000" algn="tl" rotWithShape="0">
+                    <a:srgbClr val="000000">
+                      <a:alpha val="70000"/>
+                    </a:srgbClr>
+                  </a:outerShdw>
+                </a:effectLst>
+              </a:rPr>
+              <a:t>values where </a:t>
+            </a:r>
+            <a:r>
+              <a:rPr lang="en-US" i="1" dirty="0" smtClean="0">
+                <a:ln w="18415" cmpd="sng">
+                  <a:solidFill>
+                    <a:srgbClr val="FFFFFF"/>
+                  </a:solidFill>
+                  <a:prstDash val="solid"/>
+                </a:ln>
+                <a:solidFill>
+                  <a:srgbClr val="FFFFFF"/>
+                </a:solidFill>
+                <a:effectLst>
+                  <a:outerShdw blurRad="63500" dir="3600000" algn="tl" rotWithShape="0">
+                    <a:srgbClr val="000000">
+                      <a:alpha val="70000"/>
+                    </a:srgbClr>
+                  </a:outerShdw>
+                </a:effectLst>
+              </a:rPr>
+              <a:t>x</a:t>
+            </a:r>
+            <a:r>
+              <a:rPr lang="en-US" i="1" baseline="-25000" dirty="0" smtClean="0">
+                <a:ln w="18415" cmpd="sng">
+                  <a:solidFill>
+                    <a:srgbClr val="FFFFFF"/>
+                  </a:solidFill>
+                  <a:prstDash val="solid"/>
+                </a:ln>
+                <a:solidFill>
+                  <a:srgbClr val="FFFFFF"/>
+                </a:solidFill>
+                <a:effectLst>
+                  <a:outerShdw blurRad="63500" dir="3600000" algn="tl" rotWithShape="0">
+                    <a:srgbClr val="000000">
+                      <a:alpha val="70000"/>
+                    </a:srgbClr>
+                  </a:outerShdw>
+                </a:effectLst>
+              </a:rPr>
+              <a:t>t-1 </a:t>
+            </a:r>
+            <a:r>
+              <a:rPr lang="en-US" dirty="0" smtClean="0">
+                <a:ln w="18415" cmpd="sng">
+                  <a:solidFill>
+                    <a:srgbClr val="FFFFFF"/>
+                  </a:solidFill>
+                  <a:prstDash val="solid"/>
+                </a:ln>
+                <a:solidFill>
+                  <a:srgbClr val="FFFFFF"/>
+                </a:solidFill>
+                <a:effectLst>
+                  <a:outerShdw blurRad="63500" dir="3600000" algn="tl" rotWithShape="0">
+                    <a:srgbClr val="000000">
+                      <a:alpha val="70000"/>
+                    </a:srgbClr>
+                  </a:outerShdw>
+                </a:effectLst>
+              </a:rPr>
+              <a:t>and </a:t>
+            </a:r>
+            <a:r>
+              <a:rPr lang="en-US" i="1" dirty="0" smtClean="0">
+                <a:ln w="18415" cmpd="sng">
+                  <a:solidFill>
+                    <a:srgbClr val="FFFFFF"/>
+                  </a:solidFill>
+                  <a:prstDash val="solid"/>
+                </a:ln>
+                <a:solidFill>
+                  <a:srgbClr val="FFFFFF"/>
+                </a:solidFill>
+                <a:effectLst>
+                  <a:outerShdw blurRad="63500" dir="3600000" algn="tl" rotWithShape="0">
+                    <a:srgbClr val="000000">
+                      <a:alpha val="70000"/>
+                    </a:srgbClr>
+                  </a:outerShdw>
+                </a:effectLst>
+              </a:rPr>
+              <a:t>x</a:t>
+            </a:r>
+            <a:r>
+              <a:rPr lang="en-US" i="1" baseline="-25000" dirty="0" smtClean="0">
+                <a:ln w="18415" cmpd="sng">
+                  <a:solidFill>
+                    <a:srgbClr val="FFFFFF"/>
+                  </a:solidFill>
+                  <a:prstDash val="solid"/>
+                </a:ln>
+                <a:solidFill>
+                  <a:srgbClr val="FFFFFF"/>
+                </a:solidFill>
+                <a:effectLst>
+                  <a:outerShdw blurRad="63500" dir="3600000" algn="tl" rotWithShape="0">
+                    <a:srgbClr val="000000">
+                      <a:alpha val="70000"/>
+                    </a:srgbClr>
+                  </a:outerShdw>
+                </a:effectLst>
+              </a:rPr>
+              <a:t>t+1 </a:t>
+            </a:r>
+            <a:r>
+              <a:rPr lang="en-US" dirty="0" smtClean="0">
+                <a:ln w="18415" cmpd="sng">
+                  <a:solidFill>
+                    <a:srgbClr val="FFFFFF"/>
+                  </a:solidFill>
+                  <a:prstDash val="solid"/>
+                </a:ln>
+                <a:solidFill>
+                  <a:srgbClr val="FFFFFF"/>
+                </a:solidFill>
+                <a:effectLst>
+                  <a:outerShdw blurRad="63500" dir="3600000" algn="tl" rotWithShape="0">
+                    <a:srgbClr val="000000">
+                      <a:alpha val="70000"/>
+                    </a:srgbClr>
+                  </a:outerShdw>
+                </a:effectLst>
+              </a:rPr>
+              <a:t>are known.</a:t>
+            </a:r>
+            <a:endParaRPr lang="en-US" dirty="0" smtClean="0">
+              <a:ln w="18415" cmpd="sng">
+                <a:solidFill>
+                  <a:srgbClr val="FFFFFF"/>
+                </a:solidFill>
+                <a:prstDash val="solid"/>
+              </a:ln>
+              <a:solidFill>
+                <a:srgbClr val="FFFFFF"/>
+              </a:solidFill>
+              <a:effectLst>
+                <a:outerShdw blurRad="63500" dir="3600000" algn="tl" rotWithShape="0">
+                  <a:srgbClr val="000000">
+                    <a:alpha val="70000"/>
+                  </a:srgbClr>
+                </a:outerShdw>
+              </a:effectLst>
+            </a:endParaRPr>
+          </a:p>
+          <a:p>
+            <a:r>
+              <a:rPr lang="en-US" dirty="0" smtClean="0">
+                <a:ln w="18415" cmpd="sng">
+                  <a:solidFill>
+                    <a:srgbClr val="FFFFFF"/>
+                  </a:solidFill>
+                  <a:prstDash val="solid"/>
+                </a:ln>
+                <a:solidFill>
+                  <a:srgbClr val="FFFFFF"/>
+                </a:solidFill>
+                <a:effectLst>
+                  <a:outerShdw blurRad="63500" dir="3600000" algn="tl" rotWithShape="0">
+                    <a:srgbClr val="000000">
+                      <a:alpha val="70000"/>
+                    </a:srgbClr>
+                  </a:outerShdw>
+                </a:effectLst>
+              </a:rPr>
+              <a:t>Created variables for previous hourly readings </a:t>
+            </a:r>
+            <a:r>
+              <a:rPr lang="en-US" i="1" dirty="0" smtClean="0">
+                <a:ln w="18415" cmpd="sng">
+                  <a:solidFill>
+                    <a:srgbClr val="FFFFFF"/>
+                  </a:solidFill>
+                  <a:prstDash val="solid"/>
+                </a:ln>
+                <a:solidFill>
+                  <a:srgbClr val="FFFFFF"/>
+                </a:solidFill>
+                <a:effectLst>
+                  <a:outerShdw blurRad="63500" dir="3600000" algn="tl" rotWithShape="0">
+                    <a:srgbClr val="000000">
+                      <a:alpha val="70000"/>
+                    </a:srgbClr>
+                  </a:outerShdw>
+                </a:effectLst>
+              </a:rPr>
+              <a:t>at t</a:t>
+            </a:r>
+            <a:r>
+              <a:rPr lang="en-US" i="1" baseline="-25000" dirty="0" smtClean="0">
+                <a:ln w="18415" cmpd="sng">
+                  <a:solidFill>
+                    <a:srgbClr val="FFFFFF"/>
+                  </a:solidFill>
+                  <a:prstDash val="solid"/>
+                </a:ln>
+                <a:solidFill>
+                  <a:srgbClr val="FFFFFF"/>
+                </a:solidFill>
+                <a:effectLst>
+                  <a:outerShdw blurRad="63500" dir="3600000" algn="tl" rotWithShape="0">
+                    <a:srgbClr val="000000">
+                      <a:alpha val="70000"/>
+                    </a:srgbClr>
+                  </a:outerShdw>
+                </a:effectLst>
+              </a:rPr>
+              <a:t>0</a:t>
+            </a:r>
+            <a:r>
+              <a:rPr lang="en-US" i="1" dirty="0" smtClean="0">
+                <a:ln w="18415" cmpd="sng">
+                  <a:solidFill>
+                    <a:srgbClr val="FFFFFF"/>
+                  </a:solidFill>
+                  <a:prstDash val="solid"/>
+                </a:ln>
+                <a:solidFill>
+                  <a:srgbClr val="FFFFFF"/>
+                </a:solidFill>
+                <a:effectLst>
+                  <a:outerShdw blurRad="63500" dir="3600000" algn="tl" rotWithShape="0">
+                    <a:srgbClr val="000000">
+                      <a:alpha val="70000"/>
+                    </a:srgbClr>
+                  </a:outerShdw>
+                </a:effectLst>
+              </a:rPr>
+              <a:t>-</a:t>
+            </a:r>
+            <a:r>
+              <a:rPr lang="en-US" i="1" dirty="0">
+                <a:ln w="18415" cmpd="sng">
+                  <a:solidFill>
+                    <a:srgbClr val="FFFFFF"/>
+                  </a:solidFill>
+                  <a:prstDash val="solid"/>
+                </a:ln>
+                <a:solidFill>
+                  <a:srgbClr val="FFFFFF"/>
+                </a:solidFill>
+                <a:effectLst>
+                  <a:outerShdw blurRad="63500" dir="3600000" algn="tl" rotWithShape="0">
+                    <a:srgbClr val="000000">
+                      <a:alpha val="70000"/>
+                    </a:srgbClr>
+                  </a:outerShdw>
+                </a:effectLst>
+              </a:rPr>
+              <a:t>24</a:t>
+            </a:r>
+            <a:r>
+              <a:rPr lang="en-US" i="1" dirty="0" smtClean="0">
+                <a:ln w="18415" cmpd="sng">
+                  <a:solidFill>
+                    <a:srgbClr val="FFFFFF"/>
+                  </a:solidFill>
+                  <a:prstDash val="solid"/>
+                </a:ln>
+                <a:solidFill>
+                  <a:srgbClr val="FFFFFF"/>
+                </a:solidFill>
+                <a:effectLst>
+                  <a:outerShdw blurRad="63500" dir="3600000" algn="tl" rotWithShape="0">
+                    <a:srgbClr val="000000">
+                      <a:alpha val="70000"/>
+                    </a:srgbClr>
+                  </a:outerShdw>
+                </a:effectLst>
+              </a:rPr>
+              <a:t>,  </a:t>
+            </a:r>
+            <a:r>
+              <a:rPr lang="en-US" i="1" dirty="0">
+                <a:ln w="18415" cmpd="sng">
+                  <a:solidFill>
+                    <a:srgbClr val="FFFFFF"/>
+                  </a:solidFill>
+                  <a:prstDash val="solid"/>
+                </a:ln>
+                <a:solidFill>
+                  <a:srgbClr val="FFFFFF"/>
+                </a:solidFill>
+                <a:effectLst>
+                  <a:outerShdw blurRad="63500" dir="3600000" algn="tl" rotWithShape="0">
+                    <a:srgbClr val="000000">
+                      <a:alpha val="70000"/>
+                    </a:srgbClr>
+                  </a:outerShdw>
+                </a:effectLst>
+              </a:rPr>
+              <a:t>t</a:t>
+            </a:r>
+            <a:r>
+              <a:rPr lang="en-US" i="1" baseline="-25000" dirty="0">
+                <a:ln w="18415" cmpd="sng">
+                  <a:solidFill>
+                    <a:srgbClr val="FFFFFF"/>
+                  </a:solidFill>
+                  <a:prstDash val="solid"/>
+                </a:ln>
+                <a:solidFill>
+                  <a:srgbClr val="FFFFFF"/>
+                </a:solidFill>
+                <a:effectLst>
+                  <a:outerShdw blurRad="63500" dir="3600000" algn="tl" rotWithShape="0">
+                    <a:srgbClr val="000000">
+                      <a:alpha val="70000"/>
+                    </a:srgbClr>
+                  </a:outerShdw>
+                </a:effectLst>
+              </a:rPr>
+              <a:t>0</a:t>
+            </a:r>
+            <a:r>
+              <a:rPr lang="en-US" i="1" dirty="0" smtClean="0">
+                <a:ln w="18415" cmpd="sng">
+                  <a:solidFill>
+                    <a:srgbClr val="FFFFFF"/>
+                  </a:solidFill>
+                  <a:prstDash val="solid"/>
+                </a:ln>
+                <a:solidFill>
+                  <a:srgbClr val="FFFFFF"/>
+                </a:solidFill>
+                <a:effectLst>
+                  <a:outerShdw blurRad="63500" dir="3600000" algn="tl" rotWithShape="0">
+                    <a:srgbClr val="000000">
+                      <a:alpha val="70000"/>
+                    </a:srgbClr>
+                  </a:outerShdw>
+                </a:effectLst>
+              </a:rPr>
+              <a:t>-12,  </a:t>
+            </a:r>
+            <a:r>
+              <a:rPr lang="en-US" i="1" dirty="0">
+                <a:ln w="18415" cmpd="sng">
+                  <a:solidFill>
+                    <a:srgbClr val="FFFFFF"/>
+                  </a:solidFill>
+                  <a:prstDash val="solid"/>
+                </a:ln>
+                <a:solidFill>
+                  <a:srgbClr val="FFFFFF"/>
+                </a:solidFill>
+                <a:effectLst>
+                  <a:outerShdw blurRad="63500" dir="3600000" algn="tl" rotWithShape="0">
+                    <a:srgbClr val="000000">
+                      <a:alpha val="70000"/>
+                    </a:srgbClr>
+                  </a:outerShdw>
+                </a:effectLst>
+              </a:rPr>
+              <a:t>t</a:t>
+            </a:r>
+            <a:r>
+              <a:rPr lang="en-US" i="1" baseline="-25000" dirty="0">
+                <a:ln w="18415" cmpd="sng">
+                  <a:solidFill>
+                    <a:srgbClr val="FFFFFF"/>
+                  </a:solidFill>
+                  <a:prstDash val="solid"/>
+                </a:ln>
+                <a:solidFill>
+                  <a:srgbClr val="FFFFFF"/>
+                </a:solidFill>
+                <a:effectLst>
+                  <a:outerShdw blurRad="63500" dir="3600000" algn="tl" rotWithShape="0">
+                    <a:srgbClr val="000000">
+                      <a:alpha val="70000"/>
+                    </a:srgbClr>
+                  </a:outerShdw>
+                </a:effectLst>
+              </a:rPr>
+              <a:t>0</a:t>
+            </a:r>
+            <a:r>
+              <a:rPr lang="en-US" i="1" dirty="0" smtClean="0">
+                <a:ln w="18415" cmpd="sng">
+                  <a:solidFill>
+                    <a:srgbClr val="FFFFFF"/>
+                  </a:solidFill>
+                  <a:prstDash val="solid"/>
+                </a:ln>
+                <a:solidFill>
+                  <a:srgbClr val="FFFFFF"/>
+                </a:solidFill>
+                <a:effectLst>
+                  <a:outerShdw blurRad="63500" dir="3600000" algn="tl" rotWithShape="0">
+                    <a:srgbClr val="000000">
+                      <a:alpha val="70000"/>
+                    </a:srgbClr>
+                  </a:outerShdw>
+                </a:effectLst>
+              </a:rPr>
+              <a:t>-</a:t>
+            </a:r>
+            <a:r>
+              <a:rPr lang="en-US" i="1" dirty="0">
+                <a:ln w="18415" cmpd="sng">
+                  <a:solidFill>
+                    <a:srgbClr val="FFFFFF"/>
+                  </a:solidFill>
+                  <a:prstDash val="solid"/>
+                </a:ln>
+                <a:solidFill>
+                  <a:srgbClr val="FFFFFF"/>
+                </a:solidFill>
+                <a:effectLst>
+                  <a:outerShdw blurRad="63500" dir="3600000" algn="tl" rotWithShape="0">
+                    <a:srgbClr val="000000">
+                      <a:alpha val="70000"/>
+                    </a:srgbClr>
+                  </a:outerShdw>
+                </a:effectLst>
+              </a:rPr>
+              <a:t>6</a:t>
+            </a:r>
+            <a:r>
+              <a:rPr lang="en-US" i="1" dirty="0" smtClean="0">
+                <a:ln w="18415" cmpd="sng">
+                  <a:solidFill>
+                    <a:srgbClr val="FFFFFF"/>
+                  </a:solidFill>
+                  <a:prstDash val="solid"/>
+                </a:ln>
+                <a:solidFill>
+                  <a:srgbClr val="FFFFFF"/>
+                </a:solidFill>
+                <a:effectLst>
+                  <a:outerShdw blurRad="63500" dir="3600000" algn="tl" rotWithShape="0">
+                    <a:srgbClr val="000000">
+                      <a:alpha val="70000"/>
+                    </a:srgbClr>
+                  </a:outerShdw>
+                </a:effectLst>
+              </a:rPr>
+              <a:t>, </a:t>
+            </a:r>
+            <a:r>
+              <a:rPr lang="en-US" i="1" dirty="0">
+                <a:ln w="18415" cmpd="sng">
+                  <a:solidFill>
+                    <a:srgbClr val="FFFFFF"/>
+                  </a:solidFill>
+                  <a:prstDash val="solid"/>
+                </a:ln>
+                <a:solidFill>
+                  <a:srgbClr val="FFFFFF"/>
+                </a:solidFill>
+                <a:effectLst>
+                  <a:outerShdw blurRad="63500" dir="3600000" algn="tl" rotWithShape="0">
+                    <a:srgbClr val="000000">
+                      <a:alpha val="70000"/>
+                    </a:srgbClr>
+                  </a:outerShdw>
+                </a:effectLst>
+              </a:rPr>
+              <a:t>t</a:t>
+            </a:r>
+            <a:r>
+              <a:rPr lang="en-US" i="1" baseline="-25000" dirty="0">
+                <a:ln w="18415" cmpd="sng">
+                  <a:solidFill>
+                    <a:srgbClr val="FFFFFF"/>
+                  </a:solidFill>
+                  <a:prstDash val="solid"/>
+                </a:ln>
+                <a:solidFill>
+                  <a:srgbClr val="FFFFFF"/>
+                </a:solidFill>
+                <a:effectLst>
+                  <a:outerShdw blurRad="63500" dir="3600000" algn="tl" rotWithShape="0">
+                    <a:srgbClr val="000000">
+                      <a:alpha val="70000"/>
+                    </a:srgbClr>
+                  </a:outerShdw>
+                </a:effectLst>
+              </a:rPr>
+              <a:t>0</a:t>
+            </a:r>
+            <a:r>
+              <a:rPr lang="en-US" i="1" dirty="0" smtClean="0">
+                <a:ln w="18415" cmpd="sng">
+                  <a:solidFill>
+                    <a:srgbClr val="FFFFFF"/>
+                  </a:solidFill>
+                  <a:prstDash val="solid"/>
+                </a:ln>
+                <a:solidFill>
+                  <a:srgbClr val="FFFFFF"/>
+                </a:solidFill>
+                <a:effectLst>
+                  <a:outerShdw blurRad="63500" dir="3600000" algn="tl" rotWithShape="0">
+                    <a:srgbClr val="000000">
+                      <a:alpha val="70000"/>
+                    </a:srgbClr>
+                  </a:outerShdw>
+                </a:effectLst>
+              </a:rPr>
+              <a:t>-3,  </a:t>
+            </a:r>
+            <a:r>
+              <a:rPr lang="en-US" i="1" dirty="0">
+                <a:ln w="18415" cmpd="sng">
+                  <a:solidFill>
+                    <a:srgbClr val="FFFFFF"/>
+                  </a:solidFill>
+                  <a:prstDash val="solid"/>
+                </a:ln>
+                <a:solidFill>
+                  <a:srgbClr val="FFFFFF"/>
+                </a:solidFill>
+                <a:effectLst>
+                  <a:outerShdw blurRad="63500" dir="3600000" algn="tl" rotWithShape="0">
+                    <a:srgbClr val="000000">
+                      <a:alpha val="70000"/>
+                    </a:srgbClr>
+                  </a:outerShdw>
+                </a:effectLst>
+              </a:rPr>
+              <a:t>t</a:t>
+            </a:r>
+            <a:r>
+              <a:rPr lang="en-US" i="1" baseline="-25000" dirty="0">
+                <a:ln w="18415" cmpd="sng">
+                  <a:solidFill>
+                    <a:srgbClr val="FFFFFF"/>
+                  </a:solidFill>
+                  <a:prstDash val="solid"/>
+                </a:ln>
+                <a:solidFill>
+                  <a:srgbClr val="FFFFFF"/>
+                </a:solidFill>
+                <a:effectLst>
+                  <a:outerShdw blurRad="63500" dir="3600000" algn="tl" rotWithShape="0">
+                    <a:srgbClr val="000000">
+                      <a:alpha val="70000"/>
+                    </a:srgbClr>
+                  </a:outerShdw>
+                </a:effectLst>
+              </a:rPr>
+              <a:t>0</a:t>
+            </a:r>
+            <a:r>
+              <a:rPr lang="en-US" i="1" dirty="0" smtClean="0">
+                <a:ln w="18415" cmpd="sng">
+                  <a:solidFill>
+                    <a:srgbClr val="FFFFFF"/>
+                  </a:solidFill>
+                  <a:prstDash val="solid"/>
+                </a:ln>
+                <a:solidFill>
+                  <a:srgbClr val="FFFFFF"/>
+                </a:solidFill>
+                <a:effectLst>
+                  <a:outerShdw blurRad="63500" dir="3600000" algn="tl" rotWithShape="0">
+                    <a:srgbClr val="000000">
+                      <a:alpha val="70000"/>
+                    </a:srgbClr>
+                  </a:outerShdw>
+                </a:effectLst>
+              </a:rPr>
+              <a:t>-1</a:t>
+            </a:r>
+          </a:p>
+          <a:p>
+            <a:r>
+              <a:rPr lang="en-US" dirty="0" smtClean="0">
+                <a:ln w="18415" cmpd="sng">
+                  <a:solidFill>
+                    <a:srgbClr val="FFFFFF"/>
+                  </a:solidFill>
+                  <a:prstDash val="solid"/>
+                </a:ln>
+                <a:solidFill>
+                  <a:srgbClr val="FFFFFF"/>
+                </a:solidFill>
+                <a:effectLst>
+                  <a:outerShdw blurRad="63500" dir="3600000" algn="tl" rotWithShape="0">
+                    <a:srgbClr val="000000">
+                      <a:alpha val="70000"/>
+                    </a:srgbClr>
+                  </a:outerShdw>
+                </a:effectLst>
+              </a:rPr>
+              <a:t>Conversion of wind direction from degrees to categorical variables (N, NNE, NE, ENE, E, etc.)</a:t>
+            </a:r>
+          </a:p>
+          <a:p>
+            <a:r>
+              <a:rPr lang="en-US" dirty="0" smtClean="0">
+                <a:ln w="18415" cmpd="sng">
+                  <a:solidFill>
+                    <a:srgbClr val="FFFFFF"/>
+                  </a:solidFill>
+                  <a:prstDash val="solid"/>
+                </a:ln>
+                <a:solidFill>
+                  <a:srgbClr val="FFFFFF"/>
+                </a:solidFill>
+                <a:effectLst>
+                  <a:outerShdw blurRad="63500" dir="3600000" algn="tl" rotWithShape="0">
+                    <a:srgbClr val="000000">
+                      <a:alpha val="70000"/>
+                    </a:srgbClr>
+                  </a:outerShdw>
+                </a:effectLst>
+              </a:rPr>
+              <a:t>Converted temperature from Kelvin to Celsius</a:t>
+            </a:r>
+          </a:p>
+          <a:p>
+            <a:r>
+              <a:rPr lang="en-US" dirty="0" smtClean="0">
+                <a:ln w="18415" cmpd="sng">
+                  <a:solidFill>
+                    <a:srgbClr val="FFFFFF"/>
+                  </a:solidFill>
+                  <a:prstDash val="solid"/>
+                </a:ln>
+                <a:solidFill>
+                  <a:srgbClr val="FFFFFF"/>
+                </a:solidFill>
+                <a:effectLst>
+                  <a:outerShdw blurRad="63500" dir="3600000" algn="tl" rotWithShape="0">
+                    <a:srgbClr val="000000">
+                      <a:alpha val="70000"/>
+                    </a:srgbClr>
+                  </a:outerShdw>
+                </a:effectLst>
+              </a:rPr>
+              <a:t>Created binary variables for no precipitation/ precipitation at all </a:t>
+            </a:r>
+            <a:r>
+              <a:rPr lang="en-US" i="1" dirty="0" smtClean="0">
+                <a:ln w="18415" cmpd="sng">
+                  <a:solidFill>
+                    <a:srgbClr val="FFFFFF"/>
+                  </a:solidFill>
+                  <a:prstDash val="solid"/>
+                </a:ln>
+                <a:solidFill>
+                  <a:srgbClr val="FFFFFF"/>
+                </a:solidFill>
+                <a:effectLst>
+                  <a:outerShdw blurRad="63500" dir="3600000" algn="tl" rotWithShape="0">
+                    <a:srgbClr val="000000">
+                      <a:alpha val="70000"/>
+                    </a:srgbClr>
+                  </a:outerShdw>
+                </a:effectLst>
+              </a:rPr>
+              <a:t>t</a:t>
+            </a:r>
+          </a:p>
+          <a:p>
+            <a:r>
+              <a:rPr lang="en-US" dirty="0" smtClean="0">
+                <a:ln w="18415" cmpd="sng">
+                  <a:solidFill>
+                    <a:srgbClr val="FFFFFF"/>
+                  </a:solidFill>
+                  <a:prstDash val="solid"/>
+                </a:ln>
+                <a:solidFill>
+                  <a:srgbClr val="FFFFFF"/>
+                </a:solidFill>
+                <a:effectLst>
+                  <a:outerShdw blurRad="63500" dir="3600000" algn="tl" rotWithShape="0">
+                    <a:srgbClr val="000000">
+                      <a:alpha val="70000"/>
+                    </a:srgbClr>
+                  </a:outerShdw>
+                </a:effectLst>
+              </a:rPr>
+              <a:t>Created binary variable for precipitation in the next 24 hours for </a:t>
+            </a:r>
+            <a:r>
+              <a:rPr lang="en-US" i="1" dirty="0" smtClean="0">
+                <a:ln w="18415" cmpd="sng">
+                  <a:solidFill>
+                    <a:srgbClr val="FFFFFF"/>
+                  </a:solidFill>
+                  <a:prstDash val="solid"/>
+                </a:ln>
+                <a:solidFill>
+                  <a:srgbClr val="FFFFFF"/>
+                </a:solidFill>
+                <a:effectLst>
+                  <a:outerShdw blurRad="63500" dir="3600000" algn="tl" rotWithShape="0">
+                    <a:srgbClr val="000000">
+                      <a:alpha val="70000"/>
+                    </a:srgbClr>
+                  </a:outerShdw>
+                </a:effectLst>
+              </a:rPr>
+              <a:t>t</a:t>
+            </a:r>
+            <a:r>
+              <a:rPr lang="en-US" i="1" baseline="-25000" dirty="0" smtClean="0">
+                <a:ln w="18415" cmpd="sng">
+                  <a:solidFill>
+                    <a:srgbClr val="FFFFFF"/>
+                  </a:solidFill>
+                  <a:prstDash val="solid"/>
+                </a:ln>
+                <a:solidFill>
+                  <a:srgbClr val="FFFFFF"/>
+                </a:solidFill>
+                <a:effectLst>
+                  <a:outerShdw blurRad="63500" dir="3600000" algn="tl" rotWithShape="0">
+                    <a:srgbClr val="000000">
+                      <a:alpha val="70000"/>
+                    </a:srgbClr>
+                  </a:outerShdw>
+                </a:effectLst>
+              </a:rPr>
+              <a:t>0</a:t>
+            </a:r>
+            <a:endParaRPr lang="en-US" baseline="-25000" dirty="0" smtClean="0">
+              <a:ln w="18415" cmpd="sng">
+                <a:solidFill>
+                  <a:srgbClr val="FFFFFF"/>
+                </a:solidFill>
+                <a:prstDash val="solid"/>
+              </a:ln>
+              <a:solidFill>
+                <a:srgbClr val="FFFFFF"/>
+              </a:solidFill>
+              <a:effectLst>
+                <a:outerShdw blurRad="63500" dir="3600000" algn="tl" rotWithShape="0">
+                  <a:srgbClr val="000000">
+                    <a:alpha val="70000"/>
+                  </a:srgbClr>
+                </a:outerShdw>
+              </a:effectLst>
+            </a:endParaRPr>
+          </a:p>
+          <a:p>
+            <a:r>
+              <a:rPr lang="en-US" dirty="0" smtClean="0">
+                <a:ln w="18415" cmpd="sng">
+                  <a:solidFill>
+                    <a:srgbClr val="FFFFFF"/>
+                  </a:solidFill>
+                  <a:prstDash val="solid"/>
+                </a:ln>
+                <a:solidFill>
+                  <a:srgbClr val="FFFFFF"/>
+                </a:solidFill>
+                <a:effectLst>
+                  <a:outerShdw blurRad="63500" dir="3600000" algn="tl" rotWithShape="0">
+                    <a:srgbClr val="000000">
+                      <a:alpha val="70000"/>
+                    </a:srgbClr>
+                  </a:outerShdw>
+                </a:effectLst>
+              </a:rPr>
+              <a:t>Remove all records with NAs.</a:t>
+            </a:r>
+          </a:p>
+          <a:p>
+            <a:endParaRPr lang="en-US" dirty="0" smtClean="0"/>
+          </a:p>
+          <a:p>
+            <a:pPr marL="0" indent="0">
+              <a:buNone/>
+            </a:pPr>
+            <a:endParaRPr lang="en-US" dirty="0"/>
+          </a:p>
+          <a:p>
+            <a:endParaRPr lang="en-US" dirty="0"/>
+          </a:p>
+          <a:p>
+            <a:endParaRPr lang="en-US" dirty="0"/>
+          </a:p>
+          <a:p>
+            <a:endParaRPr lang="en-US" dirty="0"/>
+          </a:p>
+        </p:txBody>
+      </p:sp>
+    </p:spTree>
+    <p:extLst>
+      <p:ext uri="{BB962C8B-B14F-4D97-AF65-F5344CB8AC3E}">
+        <p14:creationId xmlns:p14="http://schemas.microsoft.com/office/powerpoint/2010/main" val="565761930"/>
+      </p:ext>
+    </p:extLst>
+  </p:cSld>
+  <p:clrMapOvr>
+    <a:masterClrMapping/>
+  </p:clrMapOvr>
+</p:sld>
+</file>
+
+<file path=ppt/slides/slide8.xml><?xml version="1.0" encoding="utf-8"?>
+<p:sld xmlns:a="http://schemas.openxmlformats.org/drawingml/2006/main" xmlns:r="http://schemas.openxmlformats.org/officeDocument/2006/relationships" xmlns:p="http://schemas.openxmlformats.org/presentationml/2006/main">
+  <p:cSld>
+    <p:spTree>
+      <p:nvGrpSpPr>
+        <p:cNvPr id="1" name=""/>
+        <p:cNvGrpSpPr/>
+        <p:nvPr/>
+      </p:nvGrpSpPr>
+      <p:grpSpPr>
+        <a:xfrm>
+          <a:off x="0" y="0"/>
+          <a:ext cx="0" cy="0"/>
+          <a:chOff x="0" y="0"/>
+          <a:chExt cx="0" cy="0"/>
+        </a:xfrm>
+      </p:grpSpPr>
+      <p:pic>
+        <p:nvPicPr>
+          <p:cNvPr id="9" name="Picture 8" descr="white.jpg"/>
+          <p:cNvPicPr>
+            <a:picLocks noChangeAspect="1"/>
+          </p:cNvPicPr>
+          <p:nvPr/>
+        </p:nvPicPr>
+        <p:blipFill>
+          <a:blip r:embed="rId3">
+            <a:extLst>
+              <a:ext uri="{28A0092B-C50C-407E-A947-70E740481C1C}">
+                <a14:useLocalDpi xmlns:a14="http://schemas.microsoft.com/office/drawing/2010/main" val="0"/>
+              </a:ext>
+            </a:extLst>
+          </a:blip>
+          <a:stretch>
+            <a:fillRect/>
+          </a:stretch>
+        </p:blipFill>
+        <p:spPr>
+          <a:xfrm>
+            <a:off x="0" y="0"/>
+            <a:ext cx="9373506" cy="6858000"/>
+          </a:xfrm>
+          <a:prstGeom prst="rect">
+            <a:avLst/>
+          </a:prstGeom>
+        </p:spPr>
+      </p:pic>
+      <p:pic>
+        <p:nvPicPr>
+          <p:cNvPr id="8" name="Picture 7" descr="goodwp.com_16595.jpg"/>
+          <p:cNvPicPr>
+            <a:picLocks noChangeAspect="1"/>
+          </p:cNvPicPr>
+          <p:nvPr/>
+        </p:nvPicPr>
+        <p:blipFill>
+          <a:blip r:embed="rId4">
+            <a:alphaModFix amt="35000"/>
+            <a:extLst>
+              <a:ext uri="{28A0092B-C50C-407E-A947-70E740481C1C}">
+                <a14:useLocalDpi xmlns:a14="http://schemas.microsoft.com/office/drawing/2010/main" val="0"/>
+              </a:ext>
+            </a:extLst>
+          </a:blip>
+          <a:stretch>
+            <a:fillRect/>
+          </a:stretch>
+        </p:blipFill>
+        <p:spPr>
+          <a:xfrm>
+            <a:off x="-2036281" y="-441784"/>
+            <a:ext cx="13365401" cy="8090522"/>
+          </a:xfrm>
+          <a:prstGeom prst="rect">
+            <a:avLst/>
+          </a:prstGeom>
+        </p:spPr>
+      </p:pic>
+      <p:sp>
+        <p:nvSpPr>
+          <p:cNvPr id="2" name="Title 1"/>
+          <p:cNvSpPr>
+            <a:spLocks noGrp="1"/>
+          </p:cNvSpPr>
+          <p:nvPr>
+            <p:ph type="title"/>
+          </p:nvPr>
+        </p:nvSpPr>
+        <p:spPr/>
+        <p:txBody>
+          <a:bodyPr/>
+          <a:lstStyle/>
+          <a:p>
+            <a:r>
+              <a:rPr lang="en-US" dirty="0" smtClean="0"/>
+              <a:t>Variables</a:t>
+            </a:r>
+            <a:endParaRPr lang="en-US" dirty="0"/>
+          </a:p>
+        </p:txBody>
+      </p:sp>
+      <p:sp>
+        <p:nvSpPr>
+          <p:cNvPr id="3" name="Content Placeholder 2"/>
+          <p:cNvSpPr>
+            <a:spLocks noGrp="1"/>
+          </p:cNvSpPr>
+          <p:nvPr>
+            <p:ph idx="1"/>
+          </p:nvPr>
+        </p:nvSpPr>
+        <p:spPr/>
+        <p:txBody>
+          <a:bodyPr/>
+          <a:lstStyle/>
+          <a:p>
+            <a:r>
+              <a:rPr lang="en-US" dirty="0" err="1" smtClean="0"/>
+              <a:t>x</a:t>
+            </a:r>
+            <a:r>
+              <a:rPr lang="en-US" baseline="-25000" dirty="0" err="1" smtClean="0"/>
+              <a:t>t</a:t>
+            </a:r>
+            <a:r>
+              <a:rPr lang="en-US" dirty="0" smtClean="0"/>
+              <a:t> := temperature,</a:t>
+            </a:r>
+            <a:r>
+              <a:rPr lang="en-US" dirty="0"/>
+              <a:t> pressure, </a:t>
+            </a:r>
+            <a:r>
+              <a:rPr lang="en-US" dirty="0" smtClean="0"/>
+              <a:t> humidity, wind speed, % cloud coverage, precipitation/no precipitation binary for all t.</a:t>
+            </a:r>
+          </a:p>
+          <a:p>
+            <a:r>
+              <a:rPr lang="en-US" dirty="0" smtClean="0"/>
+              <a:t>Not used: wind direction, </a:t>
+            </a:r>
+            <a:r>
+              <a:rPr lang="en-US" dirty="0" err="1" smtClean="0"/>
+              <a:t>acculmulated</a:t>
+            </a:r>
+            <a:r>
+              <a:rPr lang="en-US" dirty="0" smtClean="0"/>
+              <a:t> precipitation (1 </a:t>
+            </a:r>
+            <a:r>
+              <a:rPr lang="en-US" dirty="0" err="1" smtClean="0"/>
+              <a:t>hr</a:t>
+            </a:r>
+            <a:r>
+              <a:rPr lang="en-US" dirty="0" smtClean="0"/>
+              <a:t>, 3 </a:t>
+            </a:r>
+            <a:r>
+              <a:rPr lang="en-US" dirty="0" err="1" smtClean="0"/>
+              <a:t>hr</a:t>
+            </a:r>
+            <a:r>
+              <a:rPr lang="en-US" dirty="0" smtClean="0"/>
+              <a:t>)</a:t>
+            </a:r>
+          </a:p>
+          <a:p>
+            <a:r>
+              <a:rPr lang="en-US" dirty="0" smtClean="0"/>
+              <a:t>Linear rate of change between each previous   reading and each current reading</a:t>
+            </a:r>
+          </a:p>
+        </p:txBody>
+      </p:sp>
+      <p:graphicFrame>
+        <p:nvGraphicFramePr>
+          <p:cNvPr id="5" name="Object 4"/>
+          <p:cNvGraphicFramePr>
+            <a:graphicFrameLocks noChangeAspect="1"/>
+          </p:cNvGraphicFramePr>
+          <p:nvPr>
+            <p:extLst>
+              <p:ext uri="{D42A27DB-BD31-4B8C-83A1-F6EECF244321}">
+                <p14:modId xmlns:p14="http://schemas.microsoft.com/office/powerpoint/2010/main" val="1847937802"/>
+              </p:ext>
+            </p:extLst>
+          </p:nvPr>
+        </p:nvGraphicFramePr>
+        <p:xfrm>
+          <a:off x="3278188" y="5329238"/>
+          <a:ext cx="2151062" cy="1158875"/>
+        </p:xfrm>
+        <a:graphic>
+          <a:graphicData uri="http://schemas.openxmlformats.org/presentationml/2006/ole">
+            <mc:AlternateContent xmlns:mc="http://schemas.openxmlformats.org/markup-compatibility/2006">
+              <mc:Choice xmlns:v="urn:schemas-microsoft-com:vml" Requires="v">
+                <p:oleObj spid="_x0000_s1028" name="Equation" r:id="rId5" imgW="990600" imgH="533400" progId="Equation.3">
+                  <p:embed/>
+                </p:oleObj>
+              </mc:Choice>
+              <mc:Fallback>
+                <p:oleObj name="Equation" r:id="rId5" imgW="990600" imgH="533400" progId="Equation.3">
+                  <p:embed/>
+                  <p:pic>
+                    <p:nvPicPr>
+                      <p:cNvPr id="0" name=""/>
+                      <p:cNvPicPr/>
+                      <p:nvPr/>
+                    </p:nvPicPr>
+                    <p:blipFill>
+                      <a:blip r:embed="rId6"/>
+                      <a:stretch>
+                        <a:fillRect/>
+                      </a:stretch>
+                    </p:blipFill>
+                    <p:spPr>
+                      <a:xfrm>
+                        <a:off x="3278188" y="5329238"/>
+                        <a:ext cx="2151062" cy="1158875"/>
+                      </a:xfrm>
+                      <a:prstGeom prst="rect">
+                        <a:avLst/>
+                      </a:prstGeom>
+                    </p:spPr>
+                  </p:pic>
+                </p:oleObj>
+              </mc:Fallback>
+            </mc:AlternateContent>
+          </a:graphicData>
+        </a:graphic>
+      </p:graphicFrame>
+    </p:spTree>
+    <p:extLst>
+      <p:ext uri="{BB962C8B-B14F-4D97-AF65-F5344CB8AC3E}">
+        <p14:creationId xmlns:p14="http://schemas.microsoft.com/office/powerpoint/2010/main" val="1836483887"/>
+      </p:ext>
+    </p:extLst>
+  </p:cSld>
+  <p:clrMapOvr>
+    <a:masterClrMapping/>
+  </p:clrMapOvr>
+</p:sld>
+</file>
+
+<file path=ppt/slides/slide9.xml><?xml version="1.0" encoding="utf-8"?>
 <p:sld xmlns:a="http://schemas.openxmlformats.org/drawingml/2006/main" xmlns:r="http://schemas.openxmlformats.org/officeDocument/2006/relationships" xmlns:p="http://schemas.openxmlformats.org/presentationml/2006/main">
   <p:cSld>
     <p:spTree>
@@ -4914,142 +6302,6 @@
     <p:extLst>
       <p:ext uri="{BB962C8B-B14F-4D97-AF65-F5344CB8AC3E}">
         <p14:creationId xmlns:p14="http://schemas.microsoft.com/office/powerpoint/2010/main" val="689170637"/>
-      </p:ext>
-    </p:extLst>
-  </p:cSld>
-  <p:clrMapOvr>
-    <a:masterClrMapping/>
-  </p:clrMapOvr>
-</p:sld>
-</file>
-
-<file path=ppt/slides/slide8.xml><?xml version="1.0" encoding="utf-8"?>
-<p:sld xmlns:a="http://schemas.openxmlformats.org/drawingml/2006/main" xmlns:r="http://schemas.openxmlformats.org/officeDocument/2006/relationships" xmlns:p="http://schemas.openxmlformats.org/presentationml/2006/main">
-  <p:cSld>
-    <p:spTree>
-      <p:nvGrpSpPr>
-        <p:cNvPr id="1" name=""/>
-        <p:cNvGrpSpPr/>
-        <p:nvPr/>
-      </p:nvGrpSpPr>
-      <p:grpSpPr>
-        <a:xfrm>
-          <a:off x="0" y="0"/>
-          <a:ext cx="0" cy="0"/>
-          <a:chOff x="0" y="0"/>
-          <a:chExt cx="0" cy="0"/>
-        </a:xfrm>
-      </p:grpSpPr>
-      <p:sp>
-        <p:nvSpPr>
-          <p:cNvPr id="2" name="Title 1"/>
-          <p:cNvSpPr>
-            <a:spLocks noGrp="1"/>
-          </p:cNvSpPr>
-          <p:nvPr>
-            <p:ph type="title"/>
-          </p:nvPr>
-        </p:nvSpPr>
-        <p:spPr/>
-        <p:txBody>
-          <a:bodyPr/>
-          <a:lstStyle/>
-          <a:p>
-            <a:endParaRPr lang="en-US"/>
-          </a:p>
-        </p:txBody>
-      </p:sp>
-      <p:sp>
-        <p:nvSpPr>
-          <p:cNvPr id="3" name="Content Placeholder 2"/>
-          <p:cNvSpPr>
-            <a:spLocks noGrp="1"/>
-          </p:cNvSpPr>
-          <p:nvPr>
-            <p:ph idx="1"/>
-          </p:nvPr>
-        </p:nvSpPr>
-        <p:spPr/>
-        <p:txBody>
-          <a:bodyPr/>
-          <a:lstStyle/>
-          <a:p>
-            <a:endParaRPr lang="en-US"/>
-          </a:p>
-        </p:txBody>
-      </p:sp>
-    </p:spTree>
-    <p:extLst>
-      <p:ext uri="{BB962C8B-B14F-4D97-AF65-F5344CB8AC3E}">
-        <p14:creationId xmlns:p14="http://schemas.microsoft.com/office/powerpoint/2010/main" val="565761930"/>
-      </p:ext>
-    </p:extLst>
-  </p:cSld>
-  <p:clrMapOvr>
-    <a:masterClrMapping/>
-  </p:clrMapOvr>
-</p:sld>
-</file>
-
-<file path=ppt/slides/slide9.xml><?xml version="1.0" encoding="utf-8"?>
-<p:sld xmlns:a="http://schemas.openxmlformats.org/drawingml/2006/main" xmlns:r="http://schemas.openxmlformats.org/officeDocument/2006/relationships" xmlns:p="http://schemas.openxmlformats.org/presentationml/2006/main">
-  <p:cSld>
-    <p:spTree>
-      <p:nvGrpSpPr>
-        <p:cNvPr id="1" name=""/>
-        <p:cNvGrpSpPr/>
-        <p:nvPr/>
-      </p:nvGrpSpPr>
-      <p:grpSpPr>
-        <a:xfrm>
-          <a:off x="0" y="0"/>
-          <a:ext cx="0" cy="0"/>
-          <a:chOff x="0" y="0"/>
-          <a:chExt cx="0" cy="0"/>
-        </a:xfrm>
-      </p:grpSpPr>
-      <p:sp>
-        <p:nvSpPr>
-          <p:cNvPr id="2" name="Title 1"/>
-          <p:cNvSpPr>
-            <a:spLocks noGrp="1"/>
-          </p:cNvSpPr>
-          <p:nvPr>
-            <p:ph type="title"/>
-          </p:nvPr>
-        </p:nvSpPr>
-        <p:spPr/>
-        <p:txBody>
-          <a:bodyPr/>
-          <a:lstStyle/>
-          <a:p>
-            <a:endParaRPr lang="en-US"/>
-          </a:p>
-        </p:txBody>
-      </p:sp>
-      <p:sp>
-        <p:nvSpPr>
-          <p:cNvPr id="3" name="Content Placeholder 2"/>
-          <p:cNvSpPr>
-            <a:spLocks noGrp="1"/>
-          </p:cNvSpPr>
-          <p:nvPr>
-            <p:ph idx="1"/>
-          </p:nvPr>
-        </p:nvSpPr>
-        <p:spPr/>
-        <p:txBody>
-          <a:bodyPr/>
-          <a:lstStyle/>
-          <a:p>
-            <a:endParaRPr lang="en-US"/>
-          </a:p>
-        </p:txBody>
-      </p:sp>
-    </p:spTree>
-    <p:extLst>
-      <p:ext uri="{BB962C8B-B14F-4D97-AF65-F5344CB8AC3E}">
-        <p14:creationId xmlns:p14="http://schemas.microsoft.com/office/powerpoint/2010/main" val="1836483887"/>
       </p:ext>
     </p:extLst>
   </p:cSld>

</xml_diff>